<commit_message>
added a new slide
</commit_message>
<xml_diff>
--- a/cs569_c2dm.pptx
+++ b/cs569_c2dm.pptx
@@ -18,7 +18,8 @@
     <p:sldId id="268" r:id="rId12"/>
     <p:sldId id="265" r:id="rId13"/>
     <p:sldId id="266" r:id="rId14"/>
-    <p:sldId id="269" r:id="rId15"/>
+    <p:sldId id="270" r:id="rId15"/>
+    <p:sldId id="269" r:id="rId16"/>
   </p:sldIdLst>
   <p:sldSz cx="9144000" cy="6858000" type="screen4x3"/>
   <p:notesSz cx="6858000" cy="9144000"/>
@@ -2599,6 +2600,13 @@
         </dgm:presLayoutVars>
       </dgm:prSet>
       <dgm:spPr/>
+      <dgm:t>
+        <a:bodyPr/>
+        <a:lstStyle/>
+        <a:p>
+          <a:endParaRPr lang="en-US"/>
+        </a:p>
+      </dgm:t>
     </dgm:pt>
     <dgm:pt modelId="{3B3BFDE0-9C86-46F5-89D6-96EDF5104415}" type="pres">
       <dgm:prSet presAssocID="{0B326F43-5AEF-44F6-ACAF-08E1E9D0EA16}" presName="node" presStyleLbl="node1" presStyleIdx="0" presStyleCnt="3">
@@ -2607,6 +2615,13 @@
         </dgm:presLayoutVars>
       </dgm:prSet>
       <dgm:spPr/>
+      <dgm:t>
+        <a:bodyPr/>
+        <a:lstStyle/>
+        <a:p>
+          <a:endParaRPr lang="en-US"/>
+        </a:p>
+      </dgm:t>
     </dgm:pt>
     <dgm:pt modelId="{31FE4A27-99F5-4993-A402-9035763EDBAC}" type="pres">
       <dgm:prSet presAssocID="{0B326F43-5AEF-44F6-ACAF-08E1E9D0EA16}" presName="spNode" presStyleCnt="0"/>
@@ -2615,6 +2630,13 @@
     <dgm:pt modelId="{D8803077-E2C1-447D-AF11-84905BE042BF}" type="pres">
       <dgm:prSet presAssocID="{214ACD5E-1B50-4DCE-90B2-C6EA94266ADE}" presName="sibTrans" presStyleLbl="sibTrans1D1" presStyleIdx="0" presStyleCnt="3"/>
       <dgm:spPr/>
+      <dgm:t>
+        <a:bodyPr/>
+        <a:lstStyle/>
+        <a:p>
+          <a:endParaRPr lang="en-US"/>
+        </a:p>
+      </dgm:t>
     </dgm:pt>
     <dgm:pt modelId="{6ACC8487-4122-4680-B860-5A6A6C0BCFEE}" type="pres">
       <dgm:prSet presAssocID="{3B223EB6-312F-4CDA-8104-6776B2D273B4}" presName="node" presStyleLbl="node1" presStyleIdx="1" presStyleCnt="3">
@@ -2638,6 +2660,13 @@
     <dgm:pt modelId="{47998B64-499C-428D-9334-1E4EA0E24777}" type="pres">
       <dgm:prSet presAssocID="{8537A127-2C1D-46E6-B1D0-30A39AA8A477}" presName="sibTrans" presStyleLbl="sibTrans1D1" presStyleIdx="1" presStyleCnt="3"/>
       <dgm:spPr/>
+      <dgm:t>
+        <a:bodyPr/>
+        <a:lstStyle/>
+        <a:p>
+          <a:endParaRPr lang="en-US"/>
+        </a:p>
+      </dgm:t>
     </dgm:pt>
     <dgm:pt modelId="{063D91CF-4677-4352-85E7-BB09FA5D95AA}" type="pres">
       <dgm:prSet presAssocID="{9A4FBB73-87DF-467C-B305-A9B1A54272AB}" presName="node" presStyleLbl="node1" presStyleIdx="2" presStyleCnt="3">
@@ -2646,6 +2675,13 @@
         </dgm:presLayoutVars>
       </dgm:prSet>
       <dgm:spPr/>
+      <dgm:t>
+        <a:bodyPr/>
+        <a:lstStyle/>
+        <a:p>
+          <a:endParaRPr lang="en-US"/>
+        </a:p>
+      </dgm:t>
     </dgm:pt>
     <dgm:pt modelId="{ADC09C4E-1AB8-4376-9212-0EACFA045A33}" type="pres">
       <dgm:prSet presAssocID="{9A4FBB73-87DF-467C-B305-A9B1A54272AB}" presName="spNode" presStyleCnt="0"/>
@@ -2654,19 +2690,26 @@
     <dgm:pt modelId="{1DE3B4D1-8769-459F-AF79-5DF38EE8255A}" type="pres">
       <dgm:prSet presAssocID="{AC72CFDC-DC7A-4DF5-B4A9-C2128D1F6F53}" presName="sibTrans" presStyleLbl="sibTrans1D1" presStyleIdx="2" presStyleCnt="3"/>
       <dgm:spPr/>
+      <dgm:t>
+        <a:bodyPr/>
+        <a:lstStyle/>
+        <a:p>
+          <a:endParaRPr lang="en-US"/>
+        </a:p>
+      </dgm:t>
     </dgm:pt>
   </dgm:ptLst>
   <dgm:cxnLst>
+    <dgm:cxn modelId="{B4024C27-25E9-4F24-9EED-A95F8A4F194A}" srcId="{3EF2015F-11FA-4FD4-9E88-550D96E226D8}" destId="{9A4FBB73-87DF-467C-B305-A9B1A54272AB}" srcOrd="2" destOrd="0" parTransId="{B7BAEFF3-1003-4349-B4C8-D8879EDC2369}" sibTransId="{AC72CFDC-DC7A-4DF5-B4A9-C2128D1F6F53}"/>
+    <dgm:cxn modelId="{0FA64CBE-CF55-44B8-98DC-D04FDFC19D19}" type="presOf" srcId="{0B326F43-5AEF-44F6-ACAF-08E1E9D0EA16}" destId="{3B3BFDE0-9C86-46F5-89D6-96EDF5104415}" srcOrd="0" destOrd="0" presId="urn:microsoft.com/office/officeart/2005/8/layout/cycle5"/>
+    <dgm:cxn modelId="{C356BBF7-1549-4812-97E5-F2008397E581}" srcId="{3EF2015F-11FA-4FD4-9E88-550D96E226D8}" destId="{3B223EB6-312F-4CDA-8104-6776B2D273B4}" srcOrd="1" destOrd="0" parTransId="{95B7AAE0-A1C7-457C-AEE9-1F6E1313003E}" sibTransId="{8537A127-2C1D-46E6-B1D0-30A39AA8A477}"/>
+    <dgm:cxn modelId="{15E5E10F-E6C6-493C-90FC-A75A3D4B2328}" type="presOf" srcId="{AC72CFDC-DC7A-4DF5-B4A9-C2128D1F6F53}" destId="{1DE3B4D1-8769-459F-AF79-5DF38EE8255A}" srcOrd="0" destOrd="0" presId="urn:microsoft.com/office/officeart/2005/8/layout/cycle5"/>
+    <dgm:cxn modelId="{C99DB48C-1C5F-412C-8C49-236AA5CB2473}" type="presOf" srcId="{8537A127-2C1D-46E6-B1D0-30A39AA8A477}" destId="{47998B64-499C-428D-9334-1E4EA0E24777}" srcOrd="0" destOrd="0" presId="urn:microsoft.com/office/officeart/2005/8/layout/cycle5"/>
     <dgm:cxn modelId="{18DF3107-E125-4B8A-A8FD-9AF32E886966}" type="presOf" srcId="{3B223EB6-312F-4CDA-8104-6776B2D273B4}" destId="{6ACC8487-4122-4680-B860-5A6A6C0BCFEE}" srcOrd="0" destOrd="0" presId="urn:microsoft.com/office/officeart/2005/8/layout/cycle5"/>
+    <dgm:cxn modelId="{A78C15DF-EFEB-4657-8CA8-902FC7572E59}" type="presOf" srcId="{3EF2015F-11FA-4FD4-9E88-550D96E226D8}" destId="{45BAF047-BED5-448B-94CB-9F32AFE264B5}" srcOrd="0" destOrd="0" presId="urn:microsoft.com/office/officeart/2005/8/layout/cycle5"/>
     <dgm:cxn modelId="{1E14D353-CCD7-4D56-85CC-AE7AE860B5D7}" type="presOf" srcId="{9A4FBB73-87DF-467C-B305-A9B1A54272AB}" destId="{063D91CF-4677-4352-85E7-BB09FA5D95AA}" srcOrd="0" destOrd="0" presId="urn:microsoft.com/office/officeart/2005/8/layout/cycle5"/>
-    <dgm:cxn modelId="{15E5E10F-E6C6-493C-90FC-A75A3D4B2328}" type="presOf" srcId="{AC72CFDC-DC7A-4DF5-B4A9-C2128D1F6F53}" destId="{1DE3B4D1-8769-459F-AF79-5DF38EE8255A}" srcOrd="0" destOrd="0" presId="urn:microsoft.com/office/officeart/2005/8/layout/cycle5"/>
-    <dgm:cxn modelId="{A78C15DF-EFEB-4657-8CA8-902FC7572E59}" type="presOf" srcId="{3EF2015F-11FA-4FD4-9E88-550D96E226D8}" destId="{45BAF047-BED5-448B-94CB-9F32AFE264B5}" srcOrd="0" destOrd="0" presId="urn:microsoft.com/office/officeart/2005/8/layout/cycle5"/>
+    <dgm:cxn modelId="{D74273BE-3E23-4826-862F-FF2651B1FF65}" type="presOf" srcId="{214ACD5E-1B50-4DCE-90B2-C6EA94266ADE}" destId="{D8803077-E2C1-447D-AF11-84905BE042BF}" srcOrd="0" destOrd="0" presId="urn:microsoft.com/office/officeart/2005/8/layout/cycle5"/>
     <dgm:cxn modelId="{8C3A1F06-9BBE-48B4-BA52-65F0351F8DD2}" srcId="{3EF2015F-11FA-4FD4-9E88-550D96E226D8}" destId="{0B326F43-5AEF-44F6-ACAF-08E1E9D0EA16}" srcOrd="0" destOrd="0" parTransId="{4457B5C6-7B3B-4F51-87AC-7D78328F89C4}" sibTransId="{214ACD5E-1B50-4DCE-90B2-C6EA94266ADE}"/>
-    <dgm:cxn modelId="{D74273BE-3E23-4826-862F-FF2651B1FF65}" type="presOf" srcId="{214ACD5E-1B50-4DCE-90B2-C6EA94266ADE}" destId="{D8803077-E2C1-447D-AF11-84905BE042BF}" srcOrd="0" destOrd="0" presId="urn:microsoft.com/office/officeart/2005/8/layout/cycle5"/>
-    <dgm:cxn modelId="{B4024C27-25E9-4F24-9EED-A95F8A4F194A}" srcId="{3EF2015F-11FA-4FD4-9E88-550D96E226D8}" destId="{9A4FBB73-87DF-467C-B305-A9B1A54272AB}" srcOrd="2" destOrd="0" parTransId="{B7BAEFF3-1003-4349-B4C8-D8879EDC2369}" sibTransId="{AC72CFDC-DC7A-4DF5-B4A9-C2128D1F6F53}"/>
-    <dgm:cxn modelId="{C356BBF7-1549-4812-97E5-F2008397E581}" srcId="{3EF2015F-11FA-4FD4-9E88-550D96E226D8}" destId="{3B223EB6-312F-4CDA-8104-6776B2D273B4}" srcOrd="1" destOrd="0" parTransId="{95B7AAE0-A1C7-457C-AEE9-1F6E1313003E}" sibTransId="{8537A127-2C1D-46E6-B1D0-30A39AA8A477}"/>
-    <dgm:cxn modelId="{0FA64CBE-CF55-44B8-98DC-D04FDFC19D19}" type="presOf" srcId="{0B326F43-5AEF-44F6-ACAF-08E1E9D0EA16}" destId="{3B3BFDE0-9C86-46F5-89D6-96EDF5104415}" srcOrd="0" destOrd="0" presId="urn:microsoft.com/office/officeart/2005/8/layout/cycle5"/>
-    <dgm:cxn modelId="{C99DB48C-1C5F-412C-8C49-236AA5CB2473}" type="presOf" srcId="{8537A127-2C1D-46E6-B1D0-30A39AA8A477}" destId="{47998B64-499C-428D-9334-1E4EA0E24777}" srcOrd="0" destOrd="0" presId="urn:microsoft.com/office/officeart/2005/8/layout/cycle5"/>
     <dgm:cxn modelId="{FBBDDADE-0FFD-42E8-875D-C1398E269B5B}" type="presParOf" srcId="{45BAF047-BED5-448B-94CB-9F32AFE264B5}" destId="{3B3BFDE0-9C86-46F5-89D6-96EDF5104415}" srcOrd="0" destOrd="0" presId="urn:microsoft.com/office/officeart/2005/8/layout/cycle5"/>
     <dgm:cxn modelId="{500F22C2-6179-484B-8EC0-2E52938045DC}" type="presParOf" srcId="{45BAF047-BED5-448B-94CB-9F32AFE264B5}" destId="{31FE4A27-99F5-4993-A402-9035763EDBAC}" srcOrd="1" destOrd="0" presId="urn:microsoft.com/office/officeart/2005/8/layout/cycle5"/>
     <dgm:cxn modelId="{515A6C02-C4A4-4C6C-9FAC-BABBED104A16}" type="presParOf" srcId="{45BAF047-BED5-448B-94CB-9F32AFE264B5}" destId="{D8803077-E2C1-447D-AF11-84905BE042BF}" srcOrd="2" destOrd="0" presId="urn:microsoft.com/office/officeart/2005/8/layout/cycle5"/>
@@ -2821,14 +2864,35 @@
         </dgm:presLayoutVars>
       </dgm:prSet>
       <dgm:spPr/>
+      <dgm:t>
+        <a:bodyPr/>
+        <a:lstStyle/>
+        <a:p>
+          <a:endParaRPr lang="en-US"/>
+        </a:p>
+      </dgm:t>
     </dgm:pt>
     <dgm:pt modelId="{A85BA4DE-C0E9-4218-9F94-A96593B112F5}" type="pres">
       <dgm:prSet presAssocID="{235D7F04-DF31-46F1-A40D-6C2CE15ED4A1}" presName="sibTrans" presStyleLbl="sibTrans2D1" presStyleIdx="0" presStyleCnt="2"/>
       <dgm:spPr/>
+      <dgm:t>
+        <a:bodyPr/>
+        <a:lstStyle/>
+        <a:p>
+          <a:endParaRPr lang="en-US"/>
+        </a:p>
+      </dgm:t>
     </dgm:pt>
     <dgm:pt modelId="{9807A87A-E262-4AE7-BE03-3249A9C9DD98}" type="pres">
       <dgm:prSet presAssocID="{235D7F04-DF31-46F1-A40D-6C2CE15ED4A1}" presName="connectorText" presStyleLbl="sibTrans2D1" presStyleIdx="0" presStyleCnt="2"/>
       <dgm:spPr/>
+      <dgm:t>
+        <a:bodyPr/>
+        <a:lstStyle/>
+        <a:p>
+          <a:endParaRPr lang="en-US"/>
+        </a:p>
+      </dgm:t>
     </dgm:pt>
     <dgm:pt modelId="{08DC450D-4183-428A-A63F-3A7D88540B11}" type="pres">
       <dgm:prSet presAssocID="{69837805-FBD5-4A64-8889-02F9E98ADE82}" presName="node" presStyleLbl="node1" presStyleIdx="1" presStyleCnt="3">
@@ -2848,10 +2912,24 @@
     <dgm:pt modelId="{4E6C8BEF-123F-4B7B-B88B-82C0A0231071}" type="pres">
       <dgm:prSet presAssocID="{6969A0A0-CC68-4129-A6B6-3C6CB8FEFA7A}" presName="sibTrans" presStyleLbl="sibTrans2D1" presStyleIdx="1" presStyleCnt="2"/>
       <dgm:spPr/>
+      <dgm:t>
+        <a:bodyPr/>
+        <a:lstStyle/>
+        <a:p>
+          <a:endParaRPr lang="en-US"/>
+        </a:p>
+      </dgm:t>
     </dgm:pt>
     <dgm:pt modelId="{948732B8-C4C2-4378-AE51-9F382405207B}" type="pres">
       <dgm:prSet presAssocID="{6969A0A0-CC68-4129-A6B6-3C6CB8FEFA7A}" presName="connectorText" presStyleLbl="sibTrans2D1" presStyleIdx="1" presStyleCnt="2"/>
       <dgm:spPr/>
+      <dgm:t>
+        <a:bodyPr/>
+        <a:lstStyle/>
+        <a:p>
+          <a:endParaRPr lang="en-US"/>
+        </a:p>
+      </dgm:t>
     </dgm:pt>
     <dgm:pt modelId="{6677D2FC-E21F-4F25-96FC-692B19950A4F}" type="pres">
       <dgm:prSet presAssocID="{5550DF2B-1801-4E31-9024-5A0B0D87F4EB}" presName="node" presStyleLbl="node1" presStyleIdx="2" presStyleCnt="3">
@@ -2871,8 +2949,8 @@
   </dgm:ptLst>
   <dgm:cxnLst>
     <dgm:cxn modelId="{4EBE0026-8DE3-4DB7-A39A-1F5E7D64D386}" srcId="{0A1B6F2E-2CD4-4FDE-A3AA-D5C8A812A3F6}" destId="{5550DF2B-1801-4E31-9024-5A0B0D87F4EB}" srcOrd="2" destOrd="0" parTransId="{02800597-48B0-4773-8F17-1B166754295D}" sibTransId="{727285D1-E256-4076-9117-ADA7896F9448}"/>
+    <dgm:cxn modelId="{944293BC-E974-4C89-8E4B-A204CDB73048}" type="presOf" srcId="{5142960F-0A7A-4954-9F61-5F2698FEEB9C}" destId="{DD1DDB76-6401-4AAF-BF5A-C9B87CCBE06C}" srcOrd="0" destOrd="0" presId="urn:microsoft.com/office/officeart/2005/8/layout/process1"/>
     <dgm:cxn modelId="{D6BA3D6B-8383-4F24-9DFC-84B7C001FACC}" type="presOf" srcId="{235D7F04-DF31-46F1-A40D-6C2CE15ED4A1}" destId="{9807A87A-E262-4AE7-BE03-3249A9C9DD98}" srcOrd="1" destOrd="0" presId="urn:microsoft.com/office/officeart/2005/8/layout/process1"/>
-    <dgm:cxn modelId="{944293BC-E974-4C89-8E4B-A204CDB73048}" type="presOf" srcId="{5142960F-0A7A-4954-9F61-5F2698FEEB9C}" destId="{DD1DDB76-6401-4AAF-BF5A-C9B87CCBE06C}" srcOrd="0" destOrd="0" presId="urn:microsoft.com/office/officeart/2005/8/layout/process1"/>
     <dgm:cxn modelId="{02B5CC89-5A72-4D87-A291-2F0777231D1E}" type="presOf" srcId="{6969A0A0-CC68-4129-A6B6-3C6CB8FEFA7A}" destId="{948732B8-C4C2-4378-AE51-9F382405207B}" srcOrd="1" destOrd="0" presId="urn:microsoft.com/office/officeart/2005/8/layout/process1"/>
     <dgm:cxn modelId="{8DFDE49C-CA81-4C75-B898-F08330DB37F1}" type="presOf" srcId="{235D7F04-DF31-46F1-A40D-6C2CE15ED4A1}" destId="{A85BA4DE-C0E9-4218-9F94-A96593B112F5}" srcOrd="0" destOrd="0" presId="urn:microsoft.com/office/officeart/2005/8/layout/process1"/>
     <dgm:cxn modelId="{71A5CA67-C82D-43B4-B2F2-3D897A5A6CD1}" type="presOf" srcId="{6969A0A0-CC68-4129-A6B6-3C6CB8FEFA7A}" destId="{4E6C8BEF-123F-4B7B-B88B-82C0A0231071}" srcOrd="0" destOrd="0" presId="urn:microsoft.com/office/officeart/2005/8/layout/process1"/>
@@ -3073,6 +3151,13 @@
         </dgm:presLayoutVars>
       </dgm:prSet>
       <dgm:spPr/>
+      <dgm:t>
+        <a:bodyPr/>
+        <a:lstStyle/>
+        <a:p>
+          <a:endParaRPr lang="en-US"/>
+        </a:p>
+      </dgm:t>
     </dgm:pt>
     <dgm:pt modelId="{970F880C-4D8B-4E6B-BA83-F0985DC31703}" type="pres">
       <dgm:prSet presAssocID="{707060BC-EADE-4B64-BE35-5E8AF7D0AF66}" presName="parTxOnlySpace" presStyleCnt="0"/>
@@ -3129,6 +3214,13 @@
         </dgm:presLayoutVars>
       </dgm:prSet>
       <dgm:spPr/>
+      <dgm:t>
+        <a:bodyPr/>
+        <a:lstStyle/>
+        <a:p>
+          <a:endParaRPr lang="en-US"/>
+        </a:p>
+      </dgm:t>
     </dgm:pt>
   </dgm:ptLst>
   <dgm:cxnLst>
@@ -3136,8 +3228,8 @@
     <dgm:cxn modelId="{A456DCCA-E1C0-48AB-82FA-C2DBA72C2A6D}" type="presOf" srcId="{81DD89EC-1538-46F4-8855-CCBDD5404322}" destId="{17332EA0-8CC9-48D6-9C2A-972B7C0A9CC0}" srcOrd="0" destOrd="0" presId="urn:microsoft.com/office/officeart/2005/8/layout/chevron1"/>
     <dgm:cxn modelId="{15126A52-F4DF-46A8-BB75-DB6A38E2EB3A}" type="presOf" srcId="{CB17796E-89F4-49AD-87AF-312BAACFB150}" destId="{B0DD78E7-C395-46F6-A0A6-6B564D77DD3F}" srcOrd="0" destOrd="0" presId="urn:microsoft.com/office/officeart/2005/8/layout/chevron1"/>
     <dgm:cxn modelId="{C956F3A7-2151-47D6-B7B8-8B2D3400D3C2}" srcId="{E0D85D4E-F0F7-4995-ADA9-E1704FD6A9F1}" destId="{81DD89EC-1538-46F4-8855-CCBDD5404322}" srcOrd="0" destOrd="0" parTransId="{F1306872-0450-41C0-BBB1-D7986824E1C1}" sibTransId="{707060BC-EADE-4B64-BE35-5E8AF7D0AF66}"/>
+    <dgm:cxn modelId="{81654429-F583-4361-BF55-CE8DFBA49EB4}" type="presOf" srcId="{C82E7BDB-A13D-4404-88CC-3FA948712BC0}" destId="{7250AA5F-52CD-423C-8A82-D3D395A1DE79}" srcOrd="0" destOrd="0" presId="urn:microsoft.com/office/officeart/2005/8/layout/chevron1"/>
     <dgm:cxn modelId="{B5E64379-EAA7-4FF6-8836-F177A7DAC104}" type="presOf" srcId="{1F59CAD1-6612-4DF8-A169-A5DE6C6A7852}" destId="{CE362C55-CCCE-4C7C-9D71-7FFEA3D9BD88}" srcOrd="0" destOrd="0" presId="urn:microsoft.com/office/officeart/2005/8/layout/chevron1"/>
-    <dgm:cxn modelId="{81654429-F583-4361-BF55-CE8DFBA49EB4}" type="presOf" srcId="{C82E7BDB-A13D-4404-88CC-3FA948712BC0}" destId="{7250AA5F-52CD-423C-8A82-D3D395A1DE79}" srcOrd="0" destOrd="0" presId="urn:microsoft.com/office/officeart/2005/8/layout/chevron1"/>
     <dgm:cxn modelId="{8113630E-FC60-45F3-B037-2DF26BD52865}" srcId="{E0D85D4E-F0F7-4995-ADA9-E1704FD6A9F1}" destId="{C82E7BDB-A13D-4404-88CC-3FA948712BC0}" srcOrd="2" destOrd="0" parTransId="{F0B23A40-8907-4A53-8DC0-10CE59E02509}" sibTransId="{A9ED8D4B-C940-4C4D-AFD9-78C9C12F3093}"/>
     <dgm:cxn modelId="{29A5E825-A800-45D6-8C59-66E8F9C3F75F}" type="presOf" srcId="{E0D85D4E-F0F7-4995-ADA9-E1704FD6A9F1}" destId="{15014104-4E6D-439C-BB01-506D3C5EBE6A}" srcOrd="0" destOrd="0" presId="urn:microsoft.com/office/officeart/2005/8/layout/chevron1"/>
     <dgm:cxn modelId="{4B2E617D-8D81-448D-8D95-AFFC0703432F}" srcId="{E0D85D4E-F0F7-4995-ADA9-E1704FD6A9F1}" destId="{1F59CAD1-6612-4DF8-A169-A5DE6C6A7852}" srcOrd="1" destOrd="0" parTransId="{049A492E-0C5F-4F37-BA07-D379A677B3D0}" sibTransId="{19B5A178-AF5F-470B-B782-CF02121419A7}"/>
@@ -11785,6 +11877,156 @@
         <p:spPr>
           <a:xfrm>
             <a:off x="914400" y="304800"/>
+            <a:ext cx="7315200" cy="1154097"/>
+          </a:xfrm>
+        </p:spPr>
+        <p:txBody>
+          <a:bodyPr/>
+          <a:lstStyle/>
+          <a:p>
+            <a:r>
+              <a:rPr lang="en-US" dirty="0" smtClean="0"/>
+              <a:t>Where could you use C2DM?</a:t>
+            </a:r>
+            <a:endParaRPr lang="en-US" dirty="0"/>
+          </a:p>
+        </p:txBody>
+      </p:sp>
+      <p:sp>
+        <p:nvSpPr>
+          <p:cNvPr id="3" name="Content Placeholder 2"/>
+          <p:cNvSpPr>
+            <a:spLocks noGrp="1"/>
+          </p:cNvSpPr>
+          <p:nvPr>
+            <p:ph idx="1"/>
+          </p:nvPr>
+        </p:nvSpPr>
+        <p:spPr>
+          <a:xfrm>
+            <a:off x="914400" y="1752600"/>
+            <a:ext cx="7315200" cy="4876800"/>
+          </a:xfrm>
+        </p:spPr>
+        <p:txBody>
+          <a:bodyPr>
+            <a:normAutofit fontScale="92500" lnSpcReduction="20000"/>
+          </a:bodyPr>
+          <a:lstStyle/>
+          <a:p>
+            <a:r>
+              <a:rPr lang="en-US" dirty="0" err="1" smtClean="0"/>
+              <a:t>FlightTracker</a:t>
+            </a:r>
+            <a:r>
+              <a:rPr lang="en-US" dirty="0" smtClean="0"/>
+              <a:t> – Send updates when flight information changes</a:t>
+            </a:r>
+          </a:p>
+          <a:p>
+            <a:endParaRPr lang="en-US" dirty="0" smtClean="0"/>
+          </a:p>
+          <a:p>
+            <a:r>
+              <a:rPr lang="en-US" dirty="0" err="1" smtClean="0"/>
+              <a:t>LocationTracker</a:t>
+            </a:r>
+            <a:r>
+              <a:rPr lang="en-US" dirty="0" smtClean="0"/>
+              <a:t> – Send updates when your friends visit a new location</a:t>
+            </a:r>
+          </a:p>
+          <a:p>
+            <a:endParaRPr lang="en-US" dirty="0" smtClean="0"/>
+          </a:p>
+          <a:p>
+            <a:r>
+              <a:rPr lang="en-US" dirty="0" smtClean="0"/>
+              <a:t>Shipping Applications – Send updates to the phone when FedEx/UPS updates the tracking data on their website.</a:t>
+            </a:r>
+          </a:p>
+          <a:p>
+            <a:endParaRPr lang="en-US" dirty="0" smtClean="0"/>
+          </a:p>
+          <a:p>
+            <a:r>
+              <a:rPr lang="en-US" dirty="0" smtClean="0"/>
+              <a:t>High Score Checker – Send updates to the phone when somebody beats your high score in a game.</a:t>
+            </a:r>
+          </a:p>
+          <a:p>
+            <a:endParaRPr lang="en-US" dirty="0" smtClean="0"/>
+          </a:p>
+          <a:p>
+            <a:r>
+              <a:rPr lang="en-US" dirty="0" smtClean="0"/>
+              <a:t>Instant Messaging</a:t>
+            </a:r>
+          </a:p>
+          <a:p>
+            <a:endParaRPr lang="en-US" dirty="0" smtClean="0"/>
+          </a:p>
+          <a:p>
+            <a:r>
+              <a:rPr lang="en-US" dirty="0" smtClean="0"/>
+              <a:t>Website Monitoring Service – Send a push message when your website is down and gets back up.</a:t>
+            </a:r>
+          </a:p>
+          <a:p>
+            <a:endParaRPr lang="en-US" dirty="0" smtClean="0"/>
+          </a:p>
+          <a:p>
+            <a:r>
+              <a:rPr lang="en-US" dirty="0" smtClean="0"/>
+              <a:t>…many, many more scenarios.</a:t>
+            </a:r>
+            <a:endParaRPr lang="en-US" dirty="0"/>
+          </a:p>
+        </p:txBody>
+      </p:sp>
+    </p:spTree>
+    <p:extLst>
+      <p:ext uri="{BB962C8B-B14F-4D97-AF65-F5344CB8AC3E}">
+        <p14:creationId xmlns:p14="http://schemas.microsoft.com/office/powerpoint/2010/main" val="3118685796"/>
+      </p:ext>
+    </p:extLst>
+  </p:cSld>
+  <p:clrMapOvr>
+    <a:masterClrMapping/>
+  </p:clrMapOvr>
+</p:sld>
+</file>
+
+<file path=ppt/slides/slide15.xml><?xml version="1.0" encoding="utf-8"?>
+<p:sld xmlns:a="http://schemas.openxmlformats.org/drawingml/2006/main" xmlns:r="http://schemas.openxmlformats.org/officeDocument/2006/relationships" xmlns:p="http://schemas.openxmlformats.org/presentationml/2006/main">
+  <p:cSld>
+    <p:spTree>
+      <p:nvGrpSpPr>
+        <p:cNvPr id="1" name=""/>
+        <p:cNvGrpSpPr/>
+        <p:nvPr/>
+      </p:nvGrpSpPr>
+      <p:grpSpPr>
+        <a:xfrm>
+          <a:off x="0" y="0"/>
+          <a:ext cx="0" cy="0"/>
+          <a:chOff x="0" y="0"/>
+          <a:chExt cx="0" cy="0"/>
+        </a:xfrm>
+      </p:grpSpPr>
+      <p:sp>
+        <p:nvSpPr>
+          <p:cNvPr id="2" name="Title 1"/>
+          <p:cNvSpPr>
+            <a:spLocks noGrp="1"/>
+          </p:cNvSpPr>
+          <p:nvPr>
+            <p:ph type="title"/>
+          </p:nvPr>
+        </p:nvSpPr>
+        <p:spPr>
+          <a:xfrm>
+            <a:off x="914400" y="304800"/>
             <a:ext cx="7315200" cy="870012"/>
           </a:xfrm>
         </p:spPr>

</xml_diff>